<commit_message>
Added scheme of algorithms
</commit_message>
<xml_diff>
--- a/Documentation/Метод построения велосипедных маршрутов.pptx
+++ b/Documentation/Метод построения велосипедных маршрутов.pptx
@@ -219,7 +219,7 @@
           <a:p>
             <a:fld id="{2C1D5852-CB3A-4E71-BFCB-A6B4538832B4}" type="datetimeFigureOut">
               <a:rPr lang="ru-RU" smtClean="0"/>
-              <a:t>22.05.2015</a:t>
+              <a:t>23.05.2015</a:t>
             </a:fld>
             <a:endParaRPr lang="ru-RU"/>
           </a:p>
@@ -786,7 +786,7 @@
           <a:p>
             <a:fld id="{36E5FA18-BC3F-4D53-94AB-C0F3B1B8377F}" type="datetime1">
               <a:rPr lang="ru-RU" smtClean="0"/>
-              <a:t>22.05.2015</a:t>
+              <a:t>23.05.2015</a:t>
             </a:fld>
             <a:endParaRPr lang="ru-RU"/>
           </a:p>
@@ -964,7 +964,7 @@
           <a:p>
             <a:fld id="{21567A10-74FB-4B80-9638-7BCE9781867C}" type="datetime1">
               <a:rPr lang="ru-RU" smtClean="0"/>
-              <a:t>22.05.2015</a:t>
+              <a:t>23.05.2015</a:t>
             </a:fld>
             <a:endParaRPr lang="ru-RU"/>
           </a:p>
@@ -1145,7 +1145,7 @@
           <a:p>
             <a:fld id="{81142080-0B71-4B20-B0E2-9DFC0B1CFBEE}" type="datetime1">
               <a:rPr lang="ru-RU" smtClean="0"/>
-              <a:t>22.05.2015</a:t>
+              <a:t>23.05.2015</a:t>
             </a:fld>
             <a:endParaRPr lang="ru-RU"/>
           </a:p>
@@ -1316,7 +1316,7 @@
           <a:p>
             <a:fld id="{E2255E6C-A322-4AC3-828D-B9E85E64A896}" type="datetime1">
               <a:rPr lang="ru-RU" smtClean="0"/>
-              <a:t>22.05.2015</a:t>
+              <a:t>23.05.2015</a:t>
             </a:fld>
             <a:endParaRPr lang="ru-RU"/>
           </a:p>
@@ -1563,7 +1563,7 @@
           <a:p>
             <a:fld id="{BA497A56-8E1D-40EB-A88D-614A29B47FFB}" type="datetime1">
               <a:rPr lang="ru-RU" smtClean="0"/>
-              <a:t>22.05.2015</a:t>
+              <a:t>23.05.2015</a:t>
             </a:fld>
             <a:endParaRPr lang="ru-RU"/>
           </a:p>
@@ -1796,7 +1796,7 @@
           <a:p>
             <a:fld id="{1DB1DE17-48AA-43E9-826A-5B3B2EB8A459}" type="datetime1">
               <a:rPr lang="ru-RU" smtClean="0"/>
-              <a:t>22.05.2015</a:t>
+              <a:t>23.05.2015</a:t>
             </a:fld>
             <a:endParaRPr lang="ru-RU"/>
           </a:p>
@@ -2164,7 +2164,7 @@
           <a:p>
             <a:fld id="{16378FA1-9B63-4F30-8EDE-C679ADDB5553}" type="datetime1">
               <a:rPr lang="ru-RU" smtClean="0"/>
-              <a:t>22.05.2015</a:t>
+              <a:t>23.05.2015</a:t>
             </a:fld>
             <a:endParaRPr lang="ru-RU"/>
           </a:p>
@@ -2283,7 +2283,7 @@
           <a:p>
             <a:fld id="{4B4531DD-F7E9-4FA2-981F-44CA782140A8}" type="datetime1">
               <a:rPr lang="ru-RU" smtClean="0"/>
-              <a:t>22.05.2015</a:t>
+              <a:t>23.05.2015</a:t>
             </a:fld>
             <a:endParaRPr lang="ru-RU"/>
           </a:p>
@@ -2379,7 +2379,7 @@
           <a:p>
             <a:fld id="{F6C21C51-16DF-40AF-A145-F8DD54F2C411}" type="datetime1">
               <a:rPr lang="ru-RU" smtClean="0"/>
-              <a:t>22.05.2015</a:t>
+              <a:t>23.05.2015</a:t>
             </a:fld>
             <a:endParaRPr lang="ru-RU"/>
           </a:p>
@@ -2657,7 +2657,7 @@
           <a:p>
             <a:fld id="{344ABABC-77B2-4D56-855A-B4C40E6CF024}" type="datetime1">
               <a:rPr lang="ru-RU" smtClean="0"/>
-              <a:t>22.05.2015</a:t>
+              <a:t>23.05.2015</a:t>
             </a:fld>
             <a:endParaRPr lang="ru-RU"/>
           </a:p>
@@ -2911,7 +2911,7 @@
           <a:p>
             <a:fld id="{0FD2389D-C24C-4010-A8CA-3B85131275A4}" type="datetime1">
               <a:rPr lang="ru-RU" smtClean="0"/>
-              <a:t>22.05.2015</a:t>
+              <a:t>23.05.2015</a:t>
             </a:fld>
             <a:endParaRPr lang="ru-RU"/>
           </a:p>
@@ -3125,7 +3125,7 @@
           <a:p>
             <a:fld id="{4F036123-8708-4B1E-AC94-78648E3B1BD3}" type="datetime1">
               <a:rPr lang="ru-RU" smtClean="0"/>
-              <a:t>22.05.2015</a:t>
+              <a:t>23.05.2015</a:t>
             </a:fld>
             <a:endParaRPr lang="ru-RU"/>
           </a:p>
@@ -3584,8 +3584,12 @@
           <a:lstStyle/>
           <a:p>
             <a:r>
+              <a:rPr lang="ru-RU" smtClean="0"/>
+              <a:t>Квалификационная </a:t>
+            </a:r>
+            <a:r>
               <a:rPr lang="ru-RU" dirty="0" smtClean="0"/>
-              <a:t>Квалификационная работа бакалавра</a:t>
+              <a:t>работа бакалавра</a:t>
             </a:r>
           </a:p>
           <a:p>
@@ -4036,8 +4040,8 @@
           </a:p>
         </p:txBody>
       </p:sp>
-      <mc:AlternateContent xmlns:mc="http://schemas.openxmlformats.org/markup-compatibility/2006">
-        <mc:Choice xmlns:a14="http://schemas.microsoft.com/office/drawing/2010/main" Requires="a14">
+      <mc:AlternateContent xmlns:mc="http://schemas.openxmlformats.org/markup-compatibility/2006" xmlns:a14="http://schemas.microsoft.com/office/drawing/2010/main">
+        <mc:Choice Requires="a14">
           <p:sp>
             <p:nvSpPr>
               <p:cNvPr id="6" name="Прямоугольник 5"/>
@@ -4059,6 +4063,7 @@
               </a:bodyPr>
               <a:lstStyle/>
               <a:p>
+                <a:pPr/>
                 <a14:m>
                   <m:oMathPara xmlns:m="http://schemas.openxmlformats.org/officeDocument/2006/math">
                     <m:oMathParaPr>
@@ -4066,11 +4071,15 @@
                     </m:oMathParaPr>
                     <m:oMath xmlns:m="http://schemas.openxmlformats.org/officeDocument/2006/math">
                       <m:r>
-                        <a:rPr lang="en-US" sz="2800" i="1"/>
+                        <a:rPr lang="en-US" sz="2800" i="1">
+                          <a:latin typeface="Cambria Math" panose="02040503050406030204" pitchFamily="18" charset="0"/>
+                        </a:rPr>
                         <m:t>𝑓𝑎𝑐𝑡𝑜𝑟</m:t>
                       </m:r>
                       <m:r>
-                        <a:rPr lang="en-US" sz="2800" i="1"/>
+                        <a:rPr lang="en-US" sz="2800" i="1">
+                          <a:latin typeface="Cambria Math" panose="02040503050406030204" pitchFamily="18" charset="0"/>
+                        </a:rPr>
                         <m:t>=</m:t>
                       </m:r>
                       <m:nary>
@@ -4078,18 +4087,24 @@
                           <m:chr m:val="∏"/>
                           <m:limLoc m:val="undOvr"/>
                           <m:ctrlPr>
-                            <a:rPr lang="ru-RU" sz="2800" i="1"/>
+                            <a:rPr lang="ru-RU" sz="2800" i="1">
+                              <a:latin typeface="Cambria Math" panose="02040503050406030204" pitchFamily="18" charset="0"/>
+                            </a:rPr>
                           </m:ctrlPr>
                         </m:naryPr>
                         <m:sub>
                           <m:r>
-                            <a:rPr lang="en-US" sz="2800" i="1"/>
+                            <a:rPr lang="en-US" sz="2800" i="1">
+                              <a:latin typeface="Cambria Math" panose="02040503050406030204" pitchFamily="18" charset="0"/>
+                            </a:rPr>
                             <m:t>𝑖</m:t>
                           </m:r>
                         </m:sub>
                         <m:sup>
                           <m:r>
-                            <a:rPr lang="en-US" sz="2800" i="1"/>
+                            <a:rPr lang="en-US" sz="2800" i="1">
+                              <a:latin typeface="Cambria Math" panose="02040503050406030204" pitchFamily="18" charset="0"/>
+                            </a:rPr>
                             <m:t>𝑁</m:t>
                           </m:r>
                         </m:sup>
@@ -4097,45 +4112,61 @@
                           <m:sSubSup>
                             <m:sSubSupPr>
                               <m:ctrlPr>
-                                <a:rPr lang="ru-RU" sz="2800" i="1"/>
+                                <a:rPr lang="ru-RU" sz="2800" i="1">
+                                  <a:latin typeface="Cambria Math" panose="02040503050406030204" pitchFamily="18" charset="0"/>
+                                </a:rPr>
                               </m:ctrlPr>
                             </m:sSubSupPr>
                             <m:e>
                               <m:r>
-                                <a:rPr lang="en-US" sz="2800" i="1"/>
+                                <a:rPr lang="en-US" sz="2800" i="1">
+                                  <a:latin typeface="Cambria Math" panose="02040503050406030204" pitchFamily="18" charset="0"/>
+                                </a:rPr>
                                 <m:t>𝑘</m:t>
                               </m:r>
                             </m:e>
                             <m:sub>
                               <m:r>
-                                <a:rPr lang="en-US" sz="2800" i="1"/>
+                                <a:rPr lang="en-US" sz="2800" i="1">
+                                  <a:latin typeface="Cambria Math" panose="02040503050406030204" pitchFamily="18" charset="0"/>
+                                </a:rPr>
                                 <m:t>𝑖</m:t>
                               </m:r>
                             </m:sub>
                             <m:sup>
                               <m:r>
-                                <a:rPr lang="en-US" sz="2800" i="1"/>
+                                <a:rPr lang="en-US" sz="2800" i="1">
+                                  <a:latin typeface="Cambria Math" panose="02040503050406030204" pitchFamily="18" charset="0"/>
+                                </a:rPr>
                                 <m:t>𝐿</m:t>
                               </m:r>
                               <m:r>
-                                <a:rPr lang="en-US" sz="2800" i="1"/>
+                                <a:rPr lang="en-US" sz="2800" i="1">
+                                  <a:latin typeface="Cambria Math" panose="02040503050406030204" pitchFamily="18" charset="0"/>
+                                </a:rPr>
                                 <m:t>/</m:t>
                               </m:r>
                               <m:sSub>
                                 <m:sSubPr>
                                   <m:ctrlPr>
-                                    <a:rPr lang="ru-RU" sz="2800" i="1"/>
+                                    <a:rPr lang="ru-RU" sz="2800" i="1">
+                                      <a:latin typeface="Cambria Math" panose="02040503050406030204" pitchFamily="18" charset="0"/>
+                                    </a:rPr>
                                   </m:ctrlPr>
                                 </m:sSubPr>
                                 <m:e>
                                   <m:r>
-                                    <a:rPr lang="en-US" sz="2800" i="1"/>
+                                    <a:rPr lang="en-US" sz="2800" i="1">
+                                      <a:latin typeface="Cambria Math" panose="02040503050406030204" pitchFamily="18" charset="0"/>
+                                    </a:rPr>
                                     <m:t>𝐿</m:t>
                                   </m:r>
                                 </m:e>
                                 <m:sub>
                                   <m:r>
-                                    <a:rPr lang="en-US" sz="2800" i="1"/>
+                                    <a:rPr lang="en-US" sz="2800" i="1">
+                                      <a:latin typeface="Cambria Math" panose="02040503050406030204" pitchFamily="18" charset="0"/>
+                                    </a:rPr>
                                     <m:t>𝑒</m:t>
                                   </m:r>
                                 </m:sub>
@@ -4150,13 +4181,12 @@
                 <a:endParaRPr lang="ru-RU" sz="2800" dirty="0"/>
               </a:p>
               <a:p>
-                <a:pPr/>
                 <a:endParaRPr lang="ru-RU" sz="2800" dirty="0"/>
               </a:p>
             </p:txBody>
           </p:sp>
         </mc:Choice>
-        <mc:Fallback>
+        <mc:Fallback xmlns="">
           <p:sp>
             <p:nvSpPr>
               <p:cNvPr id="6" name="Прямоугольник 5"/>
@@ -4889,7 +4919,7 @@
           <a:p>
             <a:r>
               <a:rPr lang="ru-RU" sz="3200" dirty="0" smtClean="0"/>
-              <a:t>Маршруты строятся только в районе Чертаново Южное</a:t>
+              <a:t>Маршруты строятся только в районе Чертаново Южное.</a:t>
             </a:r>
           </a:p>
           <a:p>
@@ -5491,8 +5521,13 @@
             </a:r>
             <a:r>
               <a:rPr lang="ru-RU" sz="3200" dirty="0"/>
-              <a:t> различных видов;</a:t>
-            </a:r>
+              <a:t> </a:t>
+            </a:r>
+            <a:r>
+              <a:rPr lang="ru-RU" sz="3200" dirty="0" smtClean="0"/>
+              <a:t>по различным критериям;</a:t>
+            </a:r>
+            <a:endParaRPr lang="ru-RU" sz="3200" dirty="0"/>
           </a:p>
           <a:p>
             <a:pPr lvl="0"/>
@@ -5612,14 +5647,14 @@
                 <p:ph idx="1"/>
                 <p:extLst>
                   <p:ext uri="{D42A27DB-BD31-4B8C-83A1-F6EECF244321}">
-                    <p14:modId xmlns:p14="http://schemas.microsoft.com/office/powerpoint/2010/main" val="2120103263"/>
+                    <p14:modId xmlns:p14="http://schemas.microsoft.com/office/powerpoint/2010/main" val="280687937"/>
                   </p:ext>
                 </p:extLst>
               </p:nvPr>
             </p:nvGraphicFramePr>
             <p:xfrm>
               <a:off x="838200" y="1863948"/>
-              <a:ext cx="10515600" cy="3032760"/>
+              <a:ext cx="10515600" cy="3901440"/>
             </p:xfrm>
             <a:graphic>
               <a:graphicData uri="http://schemas.openxmlformats.org/drawingml/2006/table">
@@ -5642,10 +5677,10 @@
                         <a:p>
                           <a:pPr algn="ctr"/>
                           <a:r>
-                            <a:rPr lang="ru-RU" dirty="0" smtClean="0"/>
+                            <a:rPr lang="ru-RU" sz="2000" dirty="0" smtClean="0"/>
                             <a:t>Алгоритм</a:t>
                           </a:r>
-                          <a:endParaRPr lang="ru-RU" dirty="0"/>
+                          <a:endParaRPr lang="ru-RU" sz="2000" dirty="0"/>
                         </a:p>
                       </a:txBody>
                       <a:tcPr/>
@@ -5657,10 +5692,10 @@
                         <a:p>
                           <a:pPr algn="ctr"/>
                           <a:r>
-                            <a:rPr lang="ru-RU" dirty="0" smtClean="0"/>
+                            <a:rPr lang="ru-RU" sz="2000" dirty="0" smtClean="0"/>
                             <a:t>Сложность</a:t>
                           </a:r>
-                          <a:endParaRPr lang="ru-RU" dirty="0"/>
+                          <a:endParaRPr lang="ru-RU" sz="2000" dirty="0"/>
                         </a:p>
                       </a:txBody>
                       <a:tcPr/>
@@ -5672,10 +5707,10 @@
                         <a:p>
                           <a:pPr algn="ctr"/>
                           <a:r>
-                            <a:rPr lang="ru-RU" dirty="0" smtClean="0"/>
+                            <a:rPr lang="ru-RU" sz="2000" dirty="0" smtClean="0"/>
                             <a:t>Взвешенный граф</a:t>
                           </a:r>
-                          <a:endParaRPr lang="ru-RU" dirty="0"/>
+                          <a:endParaRPr lang="ru-RU" sz="2000" dirty="0"/>
                         </a:p>
                       </a:txBody>
                       <a:tcPr/>
@@ -5687,10 +5722,10 @@
                         <a:p>
                           <a:pPr algn="ctr"/>
                           <a:r>
-                            <a:rPr lang="ru-RU" dirty="0" smtClean="0"/>
+                            <a:rPr lang="ru-RU" sz="2000" dirty="0" smtClean="0"/>
                             <a:t>Отрицательные веса</a:t>
                           </a:r>
-                          <a:endParaRPr lang="ru-RU" dirty="0"/>
+                          <a:endParaRPr lang="ru-RU" sz="2000" dirty="0"/>
                         </a:p>
                       </a:txBody>
                       <a:tcPr/>
@@ -5702,10 +5737,10 @@
                         <a:p>
                           <a:pPr algn="ctr"/>
                           <a:r>
-                            <a:rPr lang="ru-RU" dirty="0" smtClean="0"/>
+                            <a:rPr lang="ru-RU" sz="2000" dirty="0" smtClean="0"/>
                             <a:t>Использование эвристики</a:t>
                           </a:r>
-                          <a:endParaRPr lang="ru-RU" dirty="0"/>
+                          <a:endParaRPr lang="ru-RU" sz="2000" dirty="0"/>
                         </a:p>
                       </a:txBody>
                       <a:tcPr/>
@@ -5719,10 +5754,10 @@
                         <a:p>
                           <a:pPr algn="ctr"/>
                           <a:r>
-                            <a:rPr lang="ru-RU" dirty="0" smtClean="0"/>
+                            <a:rPr lang="ru-RU" sz="2000" dirty="0" smtClean="0"/>
                             <a:t>Поиск в ширину</a:t>
                           </a:r>
-                          <a:endParaRPr lang="ru-RU" dirty="0"/>
+                          <a:endParaRPr lang="ru-RU" sz="2000" dirty="0"/>
                         </a:p>
                       </a:txBody>
                       <a:tcPr/>
@@ -5740,13 +5775,13 @@
                               </m:oMathParaPr>
                               <m:oMath xmlns:m="http://schemas.openxmlformats.org/officeDocument/2006/math">
                                 <m:r>
-                                  <a:rPr lang="en-US" b="0" i="1" smtClean="0">
+                                  <a:rPr lang="en-US" sz="2000" b="0" i="1" smtClean="0">
                                     <a:latin typeface="Cambria Math" panose="02040503050406030204" pitchFamily="18" charset="0"/>
                                   </a:rPr>
                                   <m:t>𝑂</m:t>
                                 </m:r>
                                 <m:r>
-                                  <a:rPr lang="en-US" b="0" i="1" smtClean="0">
+                                  <a:rPr lang="en-US" sz="2000" b="0" i="1" smtClean="0">
                                     <a:latin typeface="Cambria Math" panose="02040503050406030204" pitchFamily="18" charset="0"/>
                                   </a:rPr>
                                   <m:t>(</m:t>
@@ -5756,14 +5791,14 @@
                                     <m:begChr m:val="|"/>
                                     <m:endChr m:val="|"/>
                                     <m:ctrlPr>
-                                      <a:rPr lang="en-US" b="0" i="1" smtClean="0">
+                                      <a:rPr lang="en-US" sz="2000" b="0" i="1" smtClean="0">
                                         <a:latin typeface="Cambria Math" panose="02040503050406030204" pitchFamily="18" charset="0"/>
                                       </a:rPr>
                                     </m:ctrlPr>
                                   </m:dPr>
                                   <m:e>
                                     <m:r>
-                                      <a:rPr lang="en-US" b="0" i="1" smtClean="0">
+                                      <a:rPr lang="en-US" sz="2000" b="0" i="1" smtClean="0">
                                         <a:latin typeface="Cambria Math" panose="02040503050406030204" pitchFamily="18" charset="0"/>
                                       </a:rPr>
                                       <m:t>𝑉</m:t>
@@ -5771,19 +5806,19 @@
                                   </m:e>
                                 </m:d>
                                 <m:r>
-                                  <a:rPr lang="en-US" b="0" i="1" smtClean="0">
+                                  <a:rPr lang="en-US" sz="2000" b="0" i="1" smtClean="0">
                                     <a:latin typeface="Cambria Math" panose="02040503050406030204" pitchFamily="18" charset="0"/>
                                   </a:rPr>
                                   <m:t>+|</m:t>
                                 </m:r>
                                 <m:r>
-                                  <a:rPr lang="en-US" b="0" i="1" smtClean="0">
+                                  <a:rPr lang="en-US" sz="2000" b="0" i="1" smtClean="0">
                                     <a:latin typeface="Cambria Math" panose="02040503050406030204" pitchFamily="18" charset="0"/>
                                   </a:rPr>
                                   <m:t>𝐸</m:t>
                                 </m:r>
                                 <m:r>
-                                  <a:rPr lang="en-US" b="0" i="1" smtClean="0">
+                                  <a:rPr lang="en-US" sz="2000" b="0" i="1" smtClean="0">
                                     <a:latin typeface="Cambria Math" panose="02040503050406030204" pitchFamily="18" charset="0"/>
                                   </a:rPr>
                                   <m:t>|)</m:t>
@@ -5791,7 +5826,7 @@
                               </m:oMath>
                             </m:oMathPara>
                           </a14:m>
-                          <a:endParaRPr lang="ru-RU" dirty="0"/>
+                          <a:endParaRPr lang="ru-RU" sz="2000" dirty="0"/>
                         </a:p>
                       </a:txBody>
                       <a:tcPr/>
@@ -5803,10 +5838,10 @@
                         <a:p>
                           <a:pPr algn="ctr"/>
                           <a:r>
-                            <a:rPr lang="en-US" dirty="0" smtClean="0"/>
+                            <a:rPr lang="en-US" sz="2000" dirty="0" smtClean="0"/>
                             <a:t>-</a:t>
                           </a:r>
-                          <a:endParaRPr lang="ru-RU" dirty="0"/>
+                          <a:endParaRPr lang="ru-RU" sz="2000" dirty="0"/>
                         </a:p>
                       </a:txBody>
                       <a:tcPr/>
@@ -5818,10 +5853,10 @@
                         <a:p>
                           <a:pPr algn="ctr"/>
                           <a:r>
-                            <a:rPr lang="en-US" dirty="0" smtClean="0"/>
+                            <a:rPr lang="en-US" sz="2000" dirty="0" smtClean="0"/>
                             <a:t>-</a:t>
                           </a:r>
-                          <a:endParaRPr lang="ru-RU" dirty="0"/>
+                          <a:endParaRPr lang="ru-RU" sz="2000" dirty="0"/>
                         </a:p>
                       </a:txBody>
                       <a:tcPr/>
@@ -5833,10 +5868,10 @@
                         <a:p>
                           <a:pPr algn="ctr"/>
                           <a:r>
-                            <a:rPr lang="ru-RU" dirty="0" smtClean="0"/>
+                            <a:rPr lang="ru-RU" sz="2000" dirty="0" smtClean="0"/>
                             <a:t>-</a:t>
                           </a:r>
-                          <a:endParaRPr lang="ru-RU" dirty="0"/>
+                          <a:endParaRPr lang="ru-RU" sz="2000" dirty="0"/>
                         </a:p>
                       </a:txBody>
                       <a:tcPr/>
@@ -5850,10 +5885,10 @@
                         <a:p>
                           <a:pPr algn="ctr"/>
                           <a:r>
-                            <a:rPr lang="ru-RU" dirty="0" smtClean="0"/>
+                            <a:rPr lang="ru-RU" sz="2000" dirty="0" smtClean="0"/>
                             <a:t>Алгоритм Беллмана — Форда</a:t>
                           </a:r>
-                          <a:endParaRPr lang="ru-RU" dirty="0"/>
+                          <a:endParaRPr lang="ru-RU" sz="2000" dirty="0"/>
                         </a:p>
                       </a:txBody>
                       <a:tcPr/>
@@ -5871,13 +5906,13 @@
                               </m:oMathParaPr>
                               <m:oMath xmlns:m="http://schemas.openxmlformats.org/officeDocument/2006/math">
                                 <m:r>
-                                  <a:rPr lang="en-US" b="0" i="1" smtClean="0">
+                                  <a:rPr lang="en-US" sz="2000" b="0" i="1" smtClean="0">
                                     <a:latin typeface="Cambria Math" panose="02040503050406030204" pitchFamily="18" charset="0"/>
                                   </a:rPr>
                                   <m:t>𝑂</m:t>
                                 </m:r>
                                 <m:r>
-                                  <a:rPr lang="en-US" b="0" i="1" smtClean="0">
+                                  <a:rPr lang="en-US" sz="2000" b="0" i="1" smtClean="0">
                                     <a:latin typeface="Cambria Math" panose="02040503050406030204" pitchFamily="18" charset="0"/>
                                   </a:rPr>
                                   <m:t>(</m:t>
@@ -5887,14 +5922,14 @@
                                     <m:begChr m:val="|"/>
                                     <m:endChr m:val="|"/>
                                     <m:ctrlPr>
-                                      <a:rPr lang="en-US" b="0" i="1" smtClean="0">
+                                      <a:rPr lang="en-US" sz="2000" b="0" i="1" smtClean="0">
                                         <a:latin typeface="Cambria Math" panose="02040503050406030204" pitchFamily="18" charset="0"/>
                                       </a:rPr>
                                     </m:ctrlPr>
                                   </m:dPr>
                                   <m:e>
                                     <m:r>
-                                      <a:rPr lang="en-US" b="0" i="1" smtClean="0">
+                                      <a:rPr lang="en-US" sz="2000" b="0" i="1" smtClean="0">
                                         <a:latin typeface="Cambria Math" panose="02040503050406030204" pitchFamily="18" charset="0"/>
                                       </a:rPr>
                                       <m:t>𝑉</m:t>
@@ -5902,19 +5937,19 @@
                                   </m:e>
                                 </m:d>
                                 <m:r>
-                                  <a:rPr lang="en-US" b="0" i="1" smtClean="0">
+                                  <a:rPr lang="en-US" sz="2000" b="0" i="1" smtClean="0">
                                     <a:latin typeface="Cambria Math" panose="02040503050406030204" pitchFamily="18" charset="0"/>
                                   </a:rPr>
                                   <m:t>∗|</m:t>
                                 </m:r>
                                 <m:r>
-                                  <a:rPr lang="en-US" b="0" i="1" smtClean="0">
+                                  <a:rPr lang="en-US" sz="2000" b="0" i="1" smtClean="0">
                                     <a:latin typeface="Cambria Math" panose="02040503050406030204" pitchFamily="18" charset="0"/>
                                   </a:rPr>
                                   <m:t>𝐸</m:t>
                                 </m:r>
                                 <m:r>
-                                  <a:rPr lang="en-US" b="0" i="1" smtClean="0">
+                                  <a:rPr lang="en-US" sz="2000" b="0" i="1" smtClean="0">
                                     <a:latin typeface="Cambria Math" panose="02040503050406030204" pitchFamily="18" charset="0"/>
                                   </a:rPr>
                                   <m:t>|)</m:t>
@@ -5922,7 +5957,7 @@
                               </m:oMath>
                             </m:oMathPara>
                           </a14:m>
-                          <a:endParaRPr lang="ru-RU" dirty="0"/>
+                          <a:endParaRPr lang="ru-RU" sz="2000" dirty="0"/>
                         </a:p>
                       </a:txBody>
                       <a:tcPr/>
@@ -5934,10 +5969,10 @@
                         <a:p>
                           <a:pPr algn="ctr"/>
                           <a:r>
-                            <a:rPr lang="en-US" dirty="0" smtClean="0"/>
+                            <a:rPr lang="en-US" sz="2000" dirty="0" smtClean="0"/>
                             <a:t>+</a:t>
                           </a:r>
-                          <a:endParaRPr lang="ru-RU" dirty="0"/>
+                          <a:endParaRPr lang="ru-RU" sz="2000" dirty="0"/>
                         </a:p>
                       </a:txBody>
                       <a:tcPr/>
@@ -5949,10 +5984,10 @@
                         <a:p>
                           <a:pPr algn="ctr"/>
                           <a:r>
-                            <a:rPr lang="en-US" dirty="0" smtClean="0"/>
+                            <a:rPr lang="en-US" sz="2000" dirty="0" smtClean="0"/>
                             <a:t>+</a:t>
                           </a:r>
-                          <a:endParaRPr lang="ru-RU" dirty="0"/>
+                          <a:endParaRPr lang="ru-RU" sz="2000" dirty="0"/>
                         </a:p>
                       </a:txBody>
                       <a:tcPr/>
@@ -5964,10 +5999,10 @@
                         <a:p>
                           <a:pPr algn="ctr"/>
                           <a:r>
-                            <a:rPr lang="ru-RU" dirty="0" smtClean="0"/>
+                            <a:rPr lang="ru-RU" sz="2000" dirty="0" smtClean="0"/>
                             <a:t>-</a:t>
                           </a:r>
-                          <a:endParaRPr lang="ru-RU" dirty="0"/>
+                          <a:endParaRPr lang="ru-RU" sz="2000" dirty="0"/>
                         </a:p>
                       </a:txBody>
                       <a:tcPr/>
@@ -5997,23 +6032,23 @@
                             <a:defRPr/>
                           </a:pPr>
                           <a:r>
-                            <a:rPr lang="ru-RU" dirty="0" smtClean="0"/>
+                            <a:rPr lang="ru-RU" sz="2000" dirty="0" smtClean="0"/>
                             <a:t>Алгоритм</a:t>
                           </a:r>
                           <a:r>
-                            <a:rPr lang="ru-RU" baseline="0" dirty="0" smtClean="0"/>
+                            <a:rPr lang="ru-RU" sz="2000" baseline="0" dirty="0" smtClean="0"/>
                             <a:t> </a:t>
                           </a:r>
                           <a:r>
-                            <a:rPr lang="ru-RU" baseline="0" dirty="0" err="1" smtClean="0"/>
+                            <a:rPr lang="ru-RU" sz="2000" baseline="0" dirty="0" err="1" smtClean="0"/>
                             <a:t>Флойда</a:t>
                           </a:r>
                           <a:r>
-                            <a:rPr lang="ru-RU" baseline="0" dirty="0" smtClean="0"/>
+                            <a:rPr lang="ru-RU" sz="2000" baseline="0" dirty="0" smtClean="0"/>
                             <a:t> </a:t>
                           </a:r>
                           <a:r>
-                            <a:rPr lang="ru-RU" sz="1800" b="0" i="0" kern="1200" dirty="0" smtClean="0">
+                            <a:rPr lang="ru-RU" sz="2000" b="0" i="0" kern="1200" dirty="0" smtClean="0">
                               <a:solidFill>
                                 <a:schemeClr val="dk1"/>
                               </a:solidFill>
@@ -6025,7 +6060,7 @@
                             <a:t>— </a:t>
                           </a:r>
                           <a:r>
-                            <a:rPr lang="ru-RU" sz="1800" b="0" i="0" kern="1200" dirty="0" err="1" smtClean="0">
+                            <a:rPr lang="ru-RU" sz="2000" b="0" i="0" kern="1200" dirty="0" err="1" smtClean="0">
                               <a:solidFill>
                                 <a:schemeClr val="dk1"/>
                               </a:solidFill>
@@ -6036,7 +6071,7 @@
                             </a:rPr>
                             <a:t>Уоршелла</a:t>
                           </a:r>
-                          <a:endParaRPr lang="ru-RU" sz="1800" b="0" i="0" kern="1200" dirty="0" smtClean="0">
+                          <a:endParaRPr lang="ru-RU" sz="2000" b="0" i="0" kern="1200" dirty="0" smtClean="0">
                             <a:solidFill>
                               <a:schemeClr val="dk1"/>
                             </a:solidFill>
@@ -6062,13 +6097,13 @@
                               </m:oMathParaPr>
                               <m:oMath xmlns:m="http://schemas.openxmlformats.org/officeDocument/2006/math">
                                 <m:r>
-                                  <a:rPr lang="en-US" b="0" i="1" smtClean="0">
+                                  <a:rPr lang="en-US" sz="2000" b="0" i="1" smtClean="0">
                                     <a:latin typeface="Cambria Math" panose="02040503050406030204" pitchFamily="18" charset="0"/>
                                   </a:rPr>
                                   <m:t>𝑂</m:t>
                                 </m:r>
                                 <m:r>
-                                  <a:rPr lang="en-US" b="0" i="1" smtClean="0">
+                                  <a:rPr lang="en-US" sz="2000" b="0" i="1" smtClean="0">
                                     <a:latin typeface="Cambria Math" panose="02040503050406030204" pitchFamily="18" charset="0"/>
                                   </a:rPr>
                                   <m:t>(</m:t>
@@ -6076,26 +6111,26 @@
                                 <m:sSup>
                                   <m:sSupPr>
                                     <m:ctrlPr>
-                                      <a:rPr lang="en-US" b="0" i="1" smtClean="0">
+                                      <a:rPr lang="en-US" sz="2000" b="0" i="1" smtClean="0">
                                         <a:latin typeface="Cambria Math" panose="02040503050406030204" pitchFamily="18" charset="0"/>
                                       </a:rPr>
                                     </m:ctrlPr>
                                   </m:sSupPr>
                                   <m:e>
                                     <m:r>
-                                      <a:rPr lang="en-US" b="0" i="1" smtClean="0">
+                                      <a:rPr lang="en-US" sz="2000" b="0" i="1" smtClean="0">
                                         <a:latin typeface="Cambria Math" panose="02040503050406030204" pitchFamily="18" charset="0"/>
                                       </a:rPr>
                                       <m:t>|</m:t>
                                     </m:r>
                                     <m:r>
-                                      <a:rPr lang="en-US" b="0" i="1" smtClean="0">
+                                      <a:rPr lang="en-US" sz="2000" b="0" i="1" smtClean="0">
                                         <a:latin typeface="Cambria Math" panose="02040503050406030204" pitchFamily="18" charset="0"/>
                                       </a:rPr>
                                       <m:t>𝑉</m:t>
                                     </m:r>
                                     <m:r>
-                                      <a:rPr lang="en-US" b="0" i="1" smtClean="0">
+                                      <a:rPr lang="en-US" sz="2000" b="0" i="1" smtClean="0">
                                         <a:latin typeface="Cambria Math" panose="02040503050406030204" pitchFamily="18" charset="0"/>
                                       </a:rPr>
                                       <m:t>|</m:t>
@@ -6103,7 +6138,7 @@
                                   </m:e>
                                   <m:sup>
                                     <m:r>
-                                      <a:rPr lang="en-US" b="0" i="1" smtClean="0">
+                                      <a:rPr lang="en-US" sz="2000" b="0" i="1" smtClean="0">
                                         <a:latin typeface="Cambria Math" panose="02040503050406030204" pitchFamily="18" charset="0"/>
                                       </a:rPr>
                                       <m:t>3</m:t>
@@ -6111,7 +6146,7 @@
                                   </m:sup>
                                 </m:sSup>
                                 <m:r>
-                                  <a:rPr lang="en-US" b="0" i="1" smtClean="0">
+                                  <a:rPr lang="en-US" sz="2000" b="0" i="1" smtClean="0">
                                     <a:latin typeface="Cambria Math" panose="02040503050406030204" pitchFamily="18" charset="0"/>
                                   </a:rPr>
                                   <m:t>)</m:t>
@@ -6119,7 +6154,7 @@
                               </m:oMath>
                             </m:oMathPara>
                           </a14:m>
-                          <a:endParaRPr lang="ru-RU" dirty="0"/>
+                          <a:endParaRPr lang="ru-RU" sz="2000" dirty="0"/>
                         </a:p>
                       </a:txBody>
                       <a:tcPr/>
@@ -6131,10 +6166,10 @@
                         <a:p>
                           <a:pPr algn="ctr"/>
                           <a:r>
-                            <a:rPr lang="en-US" dirty="0" smtClean="0"/>
+                            <a:rPr lang="en-US" sz="2000" dirty="0" smtClean="0"/>
                             <a:t>+</a:t>
                           </a:r>
-                          <a:endParaRPr lang="ru-RU" dirty="0"/>
+                          <a:endParaRPr lang="ru-RU" sz="2000" dirty="0"/>
                         </a:p>
                       </a:txBody>
                       <a:tcPr/>
@@ -6146,10 +6181,10 @@
                         <a:p>
                           <a:pPr algn="ctr"/>
                           <a:r>
-                            <a:rPr lang="en-US" dirty="0" smtClean="0"/>
+                            <a:rPr lang="en-US" sz="2000" dirty="0" smtClean="0"/>
                             <a:t>+</a:t>
                           </a:r>
-                          <a:endParaRPr lang="ru-RU" dirty="0"/>
+                          <a:endParaRPr lang="ru-RU" sz="2000" dirty="0"/>
                         </a:p>
                       </a:txBody>
                       <a:tcPr/>
@@ -6161,10 +6196,10 @@
                         <a:p>
                           <a:pPr algn="ctr"/>
                           <a:r>
-                            <a:rPr lang="ru-RU" dirty="0" smtClean="0"/>
+                            <a:rPr lang="ru-RU" sz="2000" dirty="0" smtClean="0"/>
                             <a:t>-</a:t>
                           </a:r>
-                          <a:endParaRPr lang="ru-RU" dirty="0"/>
+                          <a:endParaRPr lang="ru-RU" sz="2000" dirty="0"/>
                         </a:p>
                       </a:txBody>
                       <a:tcPr/>
@@ -6178,18 +6213,18 @@
                         <a:p>
                           <a:pPr algn="ctr"/>
                           <a:r>
-                            <a:rPr lang="ru-RU" dirty="0" smtClean="0"/>
+                            <a:rPr lang="ru-RU" sz="2000" dirty="0" smtClean="0"/>
                             <a:t>Алгоритм</a:t>
                           </a:r>
                           <a:r>
-                            <a:rPr lang="ru-RU" baseline="0" dirty="0" smtClean="0"/>
+                            <a:rPr lang="ru-RU" sz="2000" baseline="0" dirty="0" smtClean="0"/>
                             <a:t> </a:t>
                           </a:r>
                           <a:r>
-                            <a:rPr lang="ru-RU" baseline="0" dirty="0" err="1" smtClean="0"/>
+                            <a:rPr lang="ru-RU" sz="2000" baseline="0" dirty="0" err="1" smtClean="0"/>
                             <a:t>Дейкстры</a:t>
                           </a:r>
-                          <a:endParaRPr lang="ru-RU" dirty="0"/>
+                          <a:endParaRPr lang="ru-RU" sz="2000" dirty="0"/>
                         </a:p>
                       </a:txBody>
                       <a:tcPr/>
@@ -6207,13 +6242,13 @@
                               </m:oMathParaPr>
                               <m:oMath xmlns:m="http://schemas.openxmlformats.org/officeDocument/2006/math">
                                 <m:r>
-                                  <a:rPr lang="en-US" b="0" i="1" smtClean="0">
+                                  <a:rPr lang="en-US" sz="2000" b="0" i="1" smtClean="0">
                                     <a:latin typeface="Cambria Math" panose="02040503050406030204" pitchFamily="18" charset="0"/>
                                   </a:rPr>
                                   <m:t>𝑂</m:t>
                                 </m:r>
                                 <m:r>
-                                  <a:rPr lang="en-US" b="0" i="1" smtClean="0">
+                                  <a:rPr lang="en-US" sz="2000" b="0" i="1" smtClean="0">
                                     <a:latin typeface="Cambria Math" panose="02040503050406030204" pitchFamily="18" charset="0"/>
                                   </a:rPr>
                                   <m:t>(</m:t>
@@ -6221,26 +6256,26 @@
                                 <m:sSup>
                                   <m:sSupPr>
                                     <m:ctrlPr>
-                                      <a:rPr lang="en-US" b="0" i="1" smtClean="0">
+                                      <a:rPr lang="en-US" sz="2000" b="0" i="1" smtClean="0">
                                         <a:latin typeface="Cambria Math" panose="02040503050406030204" pitchFamily="18" charset="0"/>
                                       </a:rPr>
                                     </m:ctrlPr>
                                   </m:sSupPr>
                                   <m:e>
                                     <m:r>
-                                      <a:rPr lang="en-US" b="0" i="1" smtClean="0">
+                                      <a:rPr lang="en-US" sz="2000" b="0" i="1" smtClean="0">
                                         <a:latin typeface="Cambria Math" panose="02040503050406030204" pitchFamily="18" charset="0"/>
                                       </a:rPr>
                                       <m:t>|</m:t>
                                     </m:r>
                                     <m:r>
-                                      <a:rPr lang="en-US" b="0" i="1" smtClean="0">
+                                      <a:rPr lang="en-US" sz="2000" b="0" i="1" smtClean="0">
                                         <a:latin typeface="Cambria Math" panose="02040503050406030204" pitchFamily="18" charset="0"/>
                                       </a:rPr>
                                       <m:t>𝑉</m:t>
                                     </m:r>
                                     <m:r>
-                                      <a:rPr lang="en-US" b="0" i="1" smtClean="0">
+                                      <a:rPr lang="en-US" sz="2000" b="0" i="1" smtClean="0">
                                         <a:latin typeface="Cambria Math" panose="02040503050406030204" pitchFamily="18" charset="0"/>
                                       </a:rPr>
                                       <m:t>|</m:t>
@@ -6248,7 +6283,7 @@
                                   </m:e>
                                   <m:sup>
                                     <m:r>
-                                      <a:rPr lang="en-US" b="0" i="1" smtClean="0">
+                                      <a:rPr lang="en-US" sz="2000" b="0" i="1" smtClean="0">
                                         <a:latin typeface="Cambria Math" panose="02040503050406030204" pitchFamily="18" charset="0"/>
                                       </a:rPr>
                                       <m:t>2</m:t>
@@ -6256,7 +6291,7 @@
                                   </m:sup>
                                 </m:sSup>
                                 <m:r>
-                                  <a:rPr lang="en-US" b="0" i="1" smtClean="0">
+                                  <a:rPr lang="en-US" sz="2000" b="0" i="1" smtClean="0">
                                     <a:latin typeface="Cambria Math" panose="02040503050406030204" pitchFamily="18" charset="0"/>
                                   </a:rPr>
                                   <m:t>)</m:t>
@@ -6264,7 +6299,7 @@
                               </m:oMath>
                             </m:oMathPara>
                           </a14:m>
-                          <a:endParaRPr lang="ru-RU" dirty="0"/>
+                          <a:endParaRPr lang="ru-RU" sz="2000" dirty="0"/>
                         </a:p>
                       </a:txBody>
                       <a:tcPr/>
@@ -6276,10 +6311,10 @@
                         <a:p>
                           <a:pPr algn="ctr"/>
                           <a:r>
-                            <a:rPr lang="en-US" dirty="0" smtClean="0"/>
+                            <a:rPr lang="en-US" sz="2000" dirty="0" smtClean="0"/>
                             <a:t>+</a:t>
                           </a:r>
-                          <a:endParaRPr lang="ru-RU" dirty="0"/>
+                          <a:endParaRPr lang="ru-RU" sz="2000" dirty="0"/>
                         </a:p>
                       </a:txBody>
                       <a:tcPr/>
@@ -6291,10 +6326,10 @@
                         <a:p>
                           <a:pPr algn="ctr"/>
                           <a:r>
-                            <a:rPr lang="en-US" dirty="0" smtClean="0"/>
+                            <a:rPr lang="en-US" sz="2000" dirty="0" smtClean="0"/>
                             <a:t>-</a:t>
                           </a:r>
-                          <a:endParaRPr lang="ru-RU" dirty="0"/>
+                          <a:endParaRPr lang="ru-RU" sz="2000" dirty="0"/>
                         </a:p>
                       </a:txBody>
                       <a:tcPr/>
@@ -6306,10 +6341,10 @@
                         <a:p>
                           <a:pPr algn="ctr"/>
                           <a:r>
-                            <a:rPr lang="ru-RU" dirty="0" smtClean="0"/>
+                            <a:rPr lang="ru-RU" sz="2000" dirty="0" smtClean="0"/>
                             <a:t>-</a:t>
                           </a:r>
-                          <a:endParaRPr lang="ru-RU" dirty="0"/>
+                          <a:endParaRPr lang="ru-RU" sz="2000" dirty="0"/>
                         </a:p>
                       </a:txBody>
                       <a:tcPr/>
@@ -6323,10 +6358,10 @@
                         <a:p>
                           <a:pPr algn="ctr"/>
                           <a:r>
-                            <a:rPr lang="ru-RU" dirty="0" smtClean="0"/>
+                            <a:rPr lang="ru-RU" sz="2000" dirty="0" smtClean="0"/>
                             <a:t>Алгоритм А*</a:t>
                           </a:r>
-                          <a:endParaRPr lang="ru-RU" dirty="0"/>
+                          <a:endParaRPr lang="ru-RU" sz="2000" dirty="0"/>
                         </a:p>
                       </a:txBody>
                       <a:tcPr/>
@@ -6360,13 +6395,13 @@
                               </m:oMathParaPr>
                               <m:oMath xmlns:m="http://schemas.openxmlformats.org/officeDocument/2006/math">
                                 <m:r>
-                                  <a:rPr lang="en-US" b="0" i="1" smtClean="0">
+                                  <a:rPr lang="en-US" sz="2000" b="0" i="1" smtClean="0">
                                     <a:latin typeface="Cambria Math" panose="02040503050406030204" pitchFamily="18" charset="0"/>
                                   </a:rPr>
                                   <m:t>𝑂</m:t>
                                 </m:r>
                                 <m:r>
-                                  <a:rPr lang="en-US" b="0" i="1" smtClean="0">
+                                  <a:rPr lang="en-US" sz="2000" b="0" i="1" smtClean="0">
                                     <a:latin typeface="Cambria Math" panose="02040503050406030204" pitchFamily="18" charset="0"/>
                                   </a:rPr>
                                   <m:t>(</m:t>
@@ -6374,26 +6409,26 @@
                                 <m:sSup>
                                   <m:sSupPr>
                                     <m:ctrlPr>
-                                      <a:rPr lang="en-US" b="0" i="1" smtClean="0">
+                                      <a:rPr lang="en-US" sz="2000" b="0" i="1" smtClean="0">
                                         <a:latin typeface="Cambria Math" panose="02040503050406030204" pitchFamily="18" charset="0"/>
                                       </a:rPr>
                                     </m:ctrlPr>
                                   </m:sSupPr>
                                   <m:e>
                                     <m:r>
-                                      <a:rPr lang="en-US" b="0" i="1" smtClean="0">
+                                      <a:rPr lang="en-US" sz="2000" b="0" i="1" smtClean="0">
                                         <a:latin typeface="Cambria Math" panose="02040503050406030204" pitchFamily="18" charset="0"/>
                                       </a:rPr>
                                       <m:t>|</m:t>
                                     </m:r>
                                     <m:r>
-                                      <a:rPr lang="en-US" b="0" i="1" smtClean="0">
+                                      <a:rPr lang="en-US" sz="2000" b="0" i="1" smtClean="0">
                                         <a:latin typeface="Cambria Math" panose="02040503050406030204" pitchFamily="18" charset="0"/>
                                       </a:rPr>
                                       <m:t>𝑉</m:t>
                                     </m:r>
                                     <m:r>
-                                      <a:rPr lang="en-US" b="0" i="1" smtClean="0">
+                                      <a:rPr lang="en-US" sz="2000" b="0" i="1" smtClean="0">
                                         <a:latin typeface="Cambria Math" panose="02040503050406030204" pitchFamily="18" charset="0"/>
                                       </a:rPr>
                                       <m:t>|</m:t>
@@ -6401,7 +6436,7 @@
                                   </m:e>
                                   <m:sup>
                                     <m:r>
-                                      <a:rPr lang="en-US" b="0" i="1" smtClean="0">
+                                      <a:rPr lang="en-US" sz="2000" b="0" i="1" smtClean="0">
                                         <a:latin typeface="Cambria Math" panose="02040503050406030204" pitchFamily="18" charset="0"/>
                                       </a:rPr>
                                       <m:t>2</m:t>
@@ -6409,7 +6444,7 @@
                                   </m:sup>
                                 </m:sSup>
                                 <m:r>
-                                  <a:rPr lang="en-US" b="0" i="1" smtClean="0">
+                                  <a:rPr lang="en-US" sz="2000" b="0" i="1" smtClean="0">
                                     <a:latin typeface="Cambria Math" panose="02040503050406030204" pitchFamily="18" charset="0"/>
                                   </a:rPr>
                                   <m:t>)</m:t>
@@ -6417,7 +6452,7 @@
                               </m:oMath>
                             </m:oMathPara>
                           </a14:m>
-                          <a:endParaRPr lang="ru-RU" dirty="0"/>
+                          <a:endParaRPr lang="ru-RU" sz="2000" dirty="0"/>
                         </a:p>
                       </a:txBody>
                       <a:tcPr/>
@@ -6429,10 +6464,10 @@
                         <a:p>
                           <a:pPr algn="ctr"/>
                           <a:r>
-                            <a:rPr lang="en-US" dirty="0" smtClean="0"/>
+                            <a:rPr lang="en-US" sz="2000" dirty="0" smtClean="0"/>
                             <a:t>+</a:t>
                           </a:r>
-                          <a:endParaRPr lang="ru-RU" dirty="0"/>
+                          <a:endParaRPr lang="ru-RU" sz="2000" dirty="0"/>
                         </a:p>
                       </a:txBody>
                       <a:tcPr/>
@@ -6444,10 +6479,10 @@
                         <a:p>
                           <a:pPr algn="ctr"/>
                           <a:r>
-                            <a:rPr lang="en-US" dirty="0" smtClean="0"/>
+                            <a:rPr lang="en-US" sz="2000" dirty="0" smtClean="0"/>
                             <a:t>-</a:t>
                           </a:r>
-                          <a:endParaRPr lang="ru-RU" dirty="0"/>
+                          <a:endParaRPr lang="ru-RU" sz="2000" dirty="0"/>
                         </a:p>
                       </a:txBody>
                       <a:tcPr/>
@@ -6459,10 +6494,10 @@
                         <a:p>
                           <a:pPr algn="ctr"/>
                           <a:r>
-                            <a:rPr lang="ru-RU" dirty="0" smtClean="0"/>
+                            <a:rPr lang="ru-RU" sz="2000" dirty="0" smtClean="0"/>
                             <a:t>+</a:t>
                           </a:r>
-                          <a:endParaRPr lang="ru-RU" dirty="0"/>
+                          <a:endParaRPr lang="ru-RU" sz="2000" dirty="0"/>
                         </a:p>
                       </a:txBody>
                       <a:tcPr/>
@@ -6484,14 +6519,14 @@
                 <p:ph idx="1"/>
                 <p:extLst>
                   <p:ext uri="{D42A27DB-BD31-4B8C-83A1-F6EECF244321}">
-                    <p14:modId xmlns:p14="http://schemas.microsoft.com/office/powerpoint/2010/main" val="2120103263"/>
+                    <p14:modId xmlns:p14="http://schemas.microsoft.com/office/powerpoint/2010/main" val="280687937"/>
                   </p:ext>
                 </p:extLst>
               </p:nvPr>
             </p:nvGraphicFramePr>
             <p:xfrm>
               <a:off x="838200" y="1863948"/>
-              <a:ext cx="10515600" cy="3032760"/>
+              <a:ext cx="10515600" cy="3901440"/>
             </p:xfrm>
             <a:graphic>
               <a:graphicData uri="http://schemas.openxmlformats.org/drawingml/2006/table">
@@ -6506,7 +6541,7 @@
                     <a:gridCol w="2103120"/>
                     <a:gridCol w="2103120"/>
                   </a:tblGrid>
-                  <a:tr h="640080">
+                  <a:tr h="701040">
                     <a:tc>
                       <a:txBody>
                         <a:bodyPr/>
@@ -6514,10 +6549,10 @@
                         <a:p>
                           <a:pPr algn="ctr"/>
                           <a:r>
-                            <a:rPr lang="ru-RU" dirty="0" smtClean="0"/>
+                            <a:rPr lang="ru-RU" sz="2000" dirty="0" smtClean="0"/>
                             <a:t>Алгоритм</a:t>
                           </a:r>
-                          <a:endParaRPr lang="ru-RU" dirty="0"/>
+                          <a:endParaRPr lang="ru-RU" sz="2000" dirty="0"/>
                         </a:p>
                       </a:txBody>
                       <a:tcPr/>
@@ -6529,10 +6564,10 @@
                         <a:p>
                           <a:pPr algn="ctr"/>
                           <a:r>
-                            <a:rPr lang="ru-RU" dirty="0" smtClean="0"/>
+                            <a:rPr lang="ru-RU" sz="2000" dirty="0" smtClean="0"/>
                             <a:t>Сложность</a:t>
                           </a:r>
-                          <a:endParaRPr lang="ru-RU" dirty="0"/>
+                          <a:endParaRPr lang="ru-RU" sz="2000" dirty="0"/>
                         </a:p>
                       </a:txBody>
                       <a:tcPr/>
@@ -6544,10 +6579,10 @@
                         <a:p>
                           <a:pPr algn="ctr"/>
                           <a:r>
-                            <a:rPr lang="ru-RU" dirty="0" smtClean="0"/>
+                            <a:rPr lang="ru-RU" sz="2000" dirty="0" smtClean="0"/>
                             <a:t>Взвешенный граф</a:t>
                           </a:r>
-                          <a:endParaRPr lang="ru-RU" dirty="0"/>
+                          <a:endParaRPr lang="ru-RU" sz="2000" dirty="0"/>
                         </a:p>
                       </a:txBody>
                       <a:tcPr/>
@@ -6559,10 +6594,10 @@
                         <a:p>
                           <a:pPr algn="ctr"/>
                           <a:r>
-                            <a:rPr lang="ru-RU" dirty="0" smtClean="0"/>
+                            <a:rPr lang="ru-RU" sz="2000" dirty="0" smtClean="0"/>
                             <a:t>Отрицательные веса</a:t>
                           </a:r>
-                          <a:endParaRPr lang="ru-RU" dirty="0"/>
+                          <a:endParaRPr lang="ru-RU" sz="2000" dirty="0"/>
                         </a:p>
                       </a:txBody>
                       <a:tcPr/>
@@ -6574,16 +6609,16 @@
                         <a:p>
                           <a:pPr algn="ctr"/>
                           <a:r>
-                            <a:rPr lang="ru-RU" dirty="0" smtClean="0"/>
+                            <a:rPr lang="ru-RU" sz="2000" dirty="0" smtClean="0"/>
                             <a:t>Использование эвристики</a:t>
                           </a:r>
-                          <a:endParaRPr lang="ru-RU" dirty="0"/>
+                          <a:endParaRPr lang="ru-RU" sz="2000" dirty="0"/>
                         </a:p>
                       </a:txBody>
                       <a:tcPr/>
                     </a:tc>
                   </a:tr>
-                  <a:tr h="370840">
+                  <a:tr h="396240">
                     <a:tc>
                       <a:txBody>
                         <a:bodyPr/>
@@ -6591,10 +6626,10 @@
                         <a:p>
                           <a:pPr algn="ctr"/>
                           <a:r>
-                            <a:rPr lang="ru-RU" dirty="0" smtClean="0"/>
+                            <a:rPr lang="ru-RU" sz="2000" dirty="0" smtClean="0"/>
                             <a:t>Поиск в ширину</a:t>
                           </a:r>
-                          <a:endParaRPr lang="ru-RU" dirty="0"/>
+                          <a:endParaRPr lang="ru-RU" sz="2000" dirty="0"/>
                         </a:p>
                       </a:txBody>
                       <a:tcPr/>
@@ -6611,7 +6646,7 @@
                         <a:blipFill rotWithShape="0">
                           <a:blip r:embed="rId3"/>
                           <a:stretch>
-                            <a:fillRect l="-109394" t="-180328" r="-314545" b="-568852"/>
+                            <a:fillRect l="-109394" t="-184615" r="-314545" b="-736923"/>
                           </a:stretch>
                         </a:blipFill>
                       </a:tcPr>
@@ -6623,10 +6658,10 @@
                         <a:p>
                           <a:pPr algn="ctr"/>
                           <a:r>
-                            <a:rPr lang="en-US" dirty="0" smtClean="0"/>
+                            <a:rPr lang="en-US" sz="2000" dirty="0" smtClean="0"/>
                             <a:t>-</a:t>
                           </a:r>
-                          <a:endParaRPr lang="ru-RU" dirty="0"/>
+                          <a:endParaRPr lang="ru-RU" sz="2000" dirty="0"/>
                         </a:p>
                       </a:txBody>
                       <a:tcPr/>
@@ -6638,10 +6673,10 @@
                         <a:p>
                           <a:pPr algn="ctr"/>
                           <a:r>
-                            <a:rPr lang="en-US" dirty="0" smtClean="0"/>
+                            <a:rPr lang="en-US" sz="2000" dirty="0" smtClean="0"/>
                             <a:t>-</a:t>
                           </a:r>
-                          <a:endParaRPr lang="ru-RU" dirty="0"/>
+                          <a:endParaRPr lang="ru-RU" sz="2000" dirty="0"/>
                         </a:p>
                       </a:txBody>
                       <a:tcPr/>
@@ -6653,16 +6688,16 @@
                         <a:p>
                           <a:pPr algn="ctr"/>
                           <a:r>
-                            <a:rPr lang="ru-RU" dirty="0" smtClean="0"/>
+                            <a:rPr lang="ru-RU" sz="2000" dirty="0" smtClean="0"/>
                             <a:t>-</a:t>
                           </a:r>
-                          <a:endParaRPr lang="ru-RU" dirty="0"/>
+                          <a:endParaRPr lang="ru-RU" sz="2000" dirty="0"/>
                         </a:p>
                       </a:txBody>
                       <a:tcPr/>
                     </a:tc>
                   </a:tr>
-                  <a:tr h="640080">
+                  <a:tr h="1005840">
                     <a:tc>
                       <a:txBody>
                         <a:bodyPr/>
@@ -6670,10 +6705,10 @@
                         <a:p>
                           <a:pPr algn="ctr"/>
                           <a:r>
-                            <a:rPr lang="ru-RU" dirty="0" smtClean="0"/>
+                            <a:rPr lang="ru-RU" sz="2000" dirty="0" smtClean="0"/>
                             <a:t>Алгоритм Беллмана — Форда</a:t>
                           </a:r>
-                          <a:endParaRPr lang="ru-RU" dirty="0"/>
+                          <a:endParaRPr lang="ru-RU" sz="2000" dirty="0"/>
                         </a:p>
                       </a:txBody>
                       <a:tcPr/>
@@ -6690,7 +6725,7 @@
                         <a:blipFill rotWithShape="0">
                           <a:blip r:embed="rId3"/>
                           <a:stretch>
-                            <a:fillRect l="-109394" t="-161321" r="-314545" b="-227358"/>
+                            <a:fillRect l="-109394" t="-111446" r="-314545" b="-188554"/>
                           </a:stretch>
                         </a:blipFill>
                       </a:tcPr>
@@ -6702,10 +6737,10 @@
                         <a:p>
                           <a:pPr algn="ctr"/>
                           <a:r>
-                            <a:rPr lang="en-US" dirty="0" smtClean="0"/>
+                            <a:rPr lang="en-US" sz="2000" dirty="0" smtClean="0"/>
                             <a:t>+</a:t>
                           </a:r>
-                          <a:endParaRPr lang="ru-RU" dirty="0"/>
+                          <a:endParaRPr lang="ru-RU" sz="2000" dirty="0"/>
                         </a:p>
                       </a:txBody>
                       <a:tcPr/>
@@ -6717,10 +6752,10 @@
                         <a:p>
                           <a:pPr algn="ctr"/>
                           <a:r>
-                            <a:rPr lang="en-US" dirty="0" smtClean="0"/>
+                            <a:rPr lang="en-US" sz="2000" dirty="0" smtClean="0"/>
                             <a:t>+</a:t>
                           </a:r>
-                          <a:endParaRPr lang="ru-RU" dirty="0"/>
+                          <a:endParaRPr lang="ru-RU" sz="2000" dirty="0"/>
                         </a:p>
                       </a:txBody>
                       <a:tcPr/>
@@ -6732,16 +6767,16 @@
                         <a:p>
                           <a:pPr algn="ctr"/>
                           <a:r>
-                            <a:rPr lang="ru-RU" dirty="0" smtClean="0"/>
+                            <a:rPr lang="ru-RU" sz="2000" dirty="0" smtClean="0"/>
                             <a:t>-</a:t>
                           </a:r>
-                          <a:endParaRPr lang="ru-RU" dirty="0"/>
+                          <a:endParaRPr lang="ru-RU" sz="2000" dirty="0"/>
                         </a:p>
                       </a:txBody>
                       <a:tcPr/>
                     </a:tc>
                   </a:tr>
-                  <a:tr h="640080">
+                  <a:tr h="701040">
                     <a:tc>
                       <a:txBody>
                         <a:bodyPr/>
@@ -6765,23 +6800,23 @@
                             <a:defRPr/>
                           </a:pPr>
                           <a:r>
-                            <a:rPr lang="ru-RU" dirty="0" smtClean="0"/>
+                            <a:rPr lang="ru-RU" sz="2000" dirty="0" smtClean="0"/>
                             <a:t>Алгоритм</a:t>
                           </a:r>
                           <a:r>
-                            <a:rPr lang="ru-RU" baseline="0" dirty="0" smtClean="0"/>
+                            <a:rPr lang="ru-RU" sz="2000" baseline="0" dirty="0" smtClean="0"/>
                             <a:t> </a:t>
                           </a:r>
                           <a:r>
-                            <a:rPr lang="ru-RU" baseline="0" dirty="0" err="1" smtClean="0"/>
+                            <a:rPr lang="ru-RU" sz="2000" baseline="0" dirty="0" err="1" smtClean="0"/>
                             <a:t>Флойда</a:t>
                           </a:r>
                           <a:r>
-                            <a:rPr lang="ru-RU" baseline="0" dirty="0" smtClean="0"/>
+                            <a:rPr lang="ru-RU" sz="2000" baseline="0" dirty="0" smtClean="0"/>
                             <a:t> </a:t>
                           </a:r>
                           <a:r>
-                            <a:rPr lang="ru-RU" sz="1800" b="0" i="0" kern="1200" dirty="0" smtClean="0">
+                            <a:rPr lang="ru-RU" sz="2000" b="0" i="0" kern="1200" dirty="0" smtClean="0">
                               <a:solidFill>
                                 <a:schemeClr val="dk1"/>
                               </a:solidFill>
@@ -6793,7 +6828,7 @@
                             <a:t>— </a:t>
                           </a:r>
                           <a:r>
-                            <a:rPr lang="ru-RU" sz="1800" b="0" i="0" kern="1200" dirty="0" err="1" smtClean="0">
+                            <a:rPr lang="ru-RU" sz="2000" b="0" i="0" kern="1200" dirty="0" err="1" smtClean="0">
                               <a:solidFill>
                                 <a:schemeClr val="dk1"/>
                               </a:solidFill>
@@ -6804,7 +6839,7 @@
                             </a:rPr>
                             <a:t>Уоршелла</a:t>
                           </a:r>
-                          <a:endParaRPr lang="ru-RU" sz="1800" b="0" i="0" kern="1200" dirty="0" smtClean="0">
+                          <a:endParaRPr lang="ru-RU" sz="2000" b="0" i="0" kern="1200" dirty="0" smtClean="0">
                             <a:solidFill>
                               <a:schemeClr val="dk1"/>
                             </a:solidFill>
@@ -6829,7 +6864,7 @@
                         <a:blipFill rotWithShape="0">
                           <a:blip r:embed="rId3"/>
                           <a:stretch>
-                            <a:fillRect l="-109394" t="-263810" r="-314545" b="-129524"/>
+                            <a:fillRect l="-109394" t="-305217" r="-314545" b="-172174"/>
                           </a:stretch>
                         </a:blipFill>
                       </a:tcPr>
@@ -6841,10 +6876,10 @@
                         <a:p>
                           <a:pPr algn="ctr"/>
                           <a:r>
-                            <a:rPr lang="en-US" dirty="0" smtClean="0"/>
+                            <a:rPr lang="en-US" sz="2000" dirty="0" smtClean="0"/>
                             <a:t>+</a:t>
                           </a:r>
-                          <a:endParaRPr lang="ru-RU" dirty="0"/>
+                          <a:endParaRPr lang="ru-RU" sz="2000" dirty="0"/>
                         </a:p>
                       </a:txBody>
                       <a:tcPr/>
@@ -6856,10 +6891,10 @@
                         <a:p>
                           <a:pPr algn="ctr"/>
                           <a:r>
-                            <a:rPr lang="en-US" dirty="0" smtClean="0"/>
+                            <a:rPr lang="en-US" sz="2000" dirty="0" smtClean="0"/>
                             <a:t>+</a:t>
                           </a:r>
-                          <a:endParaRPr lang="ru-RU" dirty="0"/>
+                          <a:endParaRPr lang="ru-RU" sz="2000" dirty="0"/>
                         </a:p>
                       </a:txBody>
                       <a:tcPr/>
@@ -6871,16 +6906,16 @@
                         <a:p>
                           <a:pPr algn="ctr"/>
                           <a:r>
-                            <a:rPr lang="ru-RU" dirty="0" smtClean="0"/>
+                            <a:rPr lang="ru-RU" sz="2000" dirty="0" smtClean="0"/>
                             <a:t>-</a:t>
                           </a:r>
-                          <a:endParaRPr lang="ru-RU" dirty="0"/>
+                          <a:endParaRPr lang="ru-RU" sz="2000" dirty="0"/>
                         </a:p>
                       </a:txBody>
                       <a:tcPr/>
                     </a:tc>
                   </a:tr>
-                  <a:tr h="370840">
+                  <a:tr h="701040">
                     <a:tc>
                       <a:txBody>
                         <a:bodyPr/>
@@ -6888,18 +6923,18 @@
                         <a:p>
                           <a:pPr algn="ctr"/>
                           <a:r>
-                            <a:rPr lang="ru-RU" dirty="0" smtClean="0"/>
+                            <a:rPr lang="ru-RU" sz="2000" dirty="0" smtClean="0"/>
                             <a:t>Алгоритм</a:t>
                           </a:r>
                           <a:r>
-                            <a:rPr lang="ru-RU" baseline="0" dirty="0" smtClean="0"/>
+                            <a:rPr lang="ru-RU" sz="2000" baseline="0" dirty="0" smtClean="0"/>
                             <a:t> </a:t>
                           </a:r>
                           <a:r>
-                            <a:rPr lang="ru-RU" baseline="0" dirty="0" err="1" smtClean="0"/>
+                            <a:rPr lang="ru-RU" sz="2000" baseline="0" dirty="0" err="1" smtClean="0"/>
                             <a:t>Дейкстры</a:t>
                           </a:r>
-                          <a:endParaRPr lang="ru-RU" dirty="0"/>
+                          <a:endParaRPr lang="ru-RU" sz="2000" dirty="0"/>
                         </a:p>
                       </a:txBody>
                       <a:tcPr/>
@@ -6916,7 +6951,7 @@
                         <a:blipFill rotWithShape="0">
                           <a:blip r:embed="rId3"/>
                           <a:stretch>
-                            <a:fillRect l="-109394" t="-626230" r="-314545" b="-122951"/>
+                            <a:fillRect l="-109394" t="-405217" r="-314545" b="-72174"/>
                           </a:stretch>
                         </a:blipFill>
                       </a:tcPr>
@@ -6928,10 +6963,10 @@
                         <a:p>
                           <a:pPr algn="ctr"/>
                           <a:r>
-                            <a:rPr lang="en-US" dirty="0" smtClean="0"/>
+                            <a:rPr lang="en-US" sz="2000" dirty="0" smtClean="0"/>
                             <a:t>+</a:t>
                           </a:r>
-                          <a:endParaRPr lang="ru-RU" dirty="0"/>
+                          <a:endParaRPr lang="ru-RU" sz="2000" dirty="0"/>
                         </a:p>
                       </a:txBody>
                       <a:tcPr/>
@@ -6943,10 +6978,10 @@
                         <a:p>
                           <a:pPr algn="ctr"/>
                           <a:r>
-                            <a:rPr lang="en-US" dirty="0" smtClean="0"/>
+                            <a:rPr lang="en-US" sz="2000" dirty="0" smtClean="0"/>
                             <a:t>-</a:t>
                           </a:r>
-                          <a:endParaRPr lang="ru-RU" dirty="0"/>
+                          <a:endParaRPr lang="ru-RU" sz="2000" dirty="0"/>
                         </a:p>
                       </a:txBody>
                       <a:tcPr/>
@@ -6958,16 +6993,16 @@
                         <a:p>
                           <a:pPr algn="ctr"/>
                           <a:r>
-                            <a:rPr lang="ru-RU" dirty="0" smtClean="0"/>
+                            <a:rPr lang="ru-RU" sz="2000" dirty="0" smtClean="0"/>
                             <a:t>-</a:t>
                           </a:r>
-                          <a:endParaRPr lang="ru-RU" dirty="0"/>
+                          <a:endParaRPr lang="ru-RU" sz="2000" dirty="0"/>
                         </a:p>
                       </a:txBody>
                       <a:tcPr/>
                     </a:tc>
                   </a:tr>
-                  <a:tr h="370840">
+                  <a:tr h="396240">
                     <a:tc>
                       <a:txBody>
                         <a:bodyPr/>
@@ -6975,10 +7010,10 @@
                         <a:p>
                           <a:pPr algn="ctr"/>
                           <a:r>
-                            <a:rPr lang="ru-RU" dirty="0" smtClean="0"/>
+                            <a:rPr lang="ru-RU" sz="2000" dirty="0" smtClean="0"/>
                             <a:t>Алгоритм А*</a:t>
                           </a:r>
-                          <a:endParaRPr lang="ru-RU" dirty="0"/>
+                          <a:endParaRPr lang="ru-RU" sz="2000" dirty="0"/>
                         </a:p>
                       </a:txBody>
                       <a:tcPr/>
@@ -6995,7 +7030,7 @@
                         <a:blipFill rotWithShape="0">
                           <a:blip r:embed="rId3"/>
                           <a:stretch>
-                            <a:fillRect l="-109394" t="-726230" r="-314545" b="-22951"/>
+                            <a:fillRect l="-109394" t="-893846" r="-314545" b="-27692"/>
                           </a:stretch>
                         </a:blipFill>
                       </a:tcPr>
@@ -7007,10 +7042,10 @@
                         <a:p>
                           <a:pPr algn="ctr"/>
                           <a:r>
-                            <a:rPr lang="en-US" dirty="0" smtClean="0"/>
+                            <a:rPr lang="en-US" sz="2000" dirty="0" smtClean="0"/>
                             <a:t>+</a:t>
                           </a:r>
-                          <a:endParaRPr lang="ru-RU" dirty="0"/>
+                          <a:endParaRPr lang="ru-RU" sz="2000" dirty="0"/>
                         </a:p>
                       </a:txBody>
                       <a:tcPr/>
@@ -7022,10 +7057,10 @@
                         <a:p>
                           <a:pPr algn="ctr"/>
                           <a:r>
-                            <a:rPr lang="en-US" dirty="0" smtClean="0"/>
+                            <a:rPr lang="en-US" sz="2000" dirty="0" smtClean="0"/>
                             <a:t>-</a:t>
                           </a:r>
-                          <a:endParaRPr lang="ru-RU" dirty="0"/>
+                          <a:endParaRPr lang="ru-RU" sz="2000" dirty="0"/>
                         </a:p>
                       </a:txBody>
                       <a:tcPr/>
@@ -7037,10 +7072,10 @@
                         <a:p>
                           <a:pPr algn="ctr"/>
                           <a:r>
-                            <a:rPr lang="ru-RU" dirty="0" smtClean="0"/>
+                            <a:rPr lang="ru-RU" sz="2000" dirty="0" smtClean="0"/>
                             <a:t>+</a:t>
                           </a:r>
-                          <a:endParaRPr lang="ru-RU" dirty="0"/>
+                          <a:endParaRPr lang="ru-RU" sz="2000" dirty="0"/>
                         </a:p>
                       </a:txBody>
                       <a:tcPr/>
@@ -8157,7 +8192,7 @@
         <p:spPr>
           <a:xfrm>
             <a:off x="838200" y="1325562"/>
-            <a:ext cx="10515600" cy="1605645"/>
+            <a:ext cx="10515600" cy="2443361"/>
           </a:xfrm>
         </p:spPr>
         <p:txBody>
@@ -8209,7 +8244,7 @@
             </a:pPr>
             <a:r>
               <a:rPr lang="ru-RU" sz="2000" dirty="0" smtClean="0"/>
-              <a:t>3. Получение вершин графа (пересечения дорог)</a:t>
+              <a:t>3. Удаление из базы всех дорог, по которым запрещено движение на велосипеде</a:t>
             </a:r>
           </a:p>
           <a:p>
@@ -8217,8 +8252,25 @@
               <a:buNone/>
             </a:pPr>
             <a:r>
+              <a:rPr lang="ru-RU" sz="2000" dirty="0"/>
+              <a:t>4</a:t>
+            </a:r>
+            <a:r>
               <a:rPr lang="ru-RU" sz="2000" dirty="0" smtClean="0"/>
-              <a:t>4. Создание </a:t>
+              <a:t>. Получение вершин графа (пересечения дорог)</a:t>
+            </a:r>
+          </a:p>
+          <a:p>
+            <a:pPr marL="0" indent="0" algn="ctr">
+              <a:buNone/>
+            </a:pPr>
+            <a:r>
+              <a:rPr lang="ru-RU" sz="2000" dirty="0"/>
+              <a:t>5</a:t>
+            </a:r>
+            <a:r>
+              <a:rPr lang="ru-RU" sz="2000" dirty="0" smtClean="0"/>
+              <a:t>. Создание </a:t>
             </a:r>
             <a:r>
               <a:rPr lang="ru-RU" sz="2000" dirty="0" err="1" smtClean="0"/>
@@ -8294,8 +8346,8 @@
         </p:nvSpPr>
         <p:spPr>
           <a:xfrm>
-            <a:off x="838200" y="3376551"/>
-            <a:ext cx="10515600" cy="2769989"/>
+            <a:off x="838200" y="3768923"/>
+            <a:ext cx="10515600" cy="2800767"/>
           </a:xfrm>
           <a:prstGeom prst="rect">
             <a:avLst/>
@@ -8332,7 +8384,7 @@
           <a:p>
             <a:pPr lvl="3"/>
             <a:r>
-              <a:rPr lang="en-US" sz="1900" dirty="0" smtClean="0">
+              <a:rPr lang="en-US" sz="2000" dirty="0" smtClean="0">
                 <a:highlight>
                   <a:srgbClr val="FFFFFF"/>
                 </a:highlight>
@@ -8342,7 +8394,7 @@
               <a:t>1. </a:t>
             </a:r>
             <a:r>
-              <a:rPr lang="ru-RU" sz="1900" dirty="0" smtClean="0">
+              <a:rPr lang="ru-RU" sz="2000" dirty="0" smtClean="0">
                 <a:highlight>
                   <a:srgbClr val="FFFFFF"/>
                 </a:highlight>
@@ -8352,7 +8404,7 @@
               <a:t>Точка (</a:t>
             </a:r>
             <a:r>
-              <a:rPr lang="en-US" sz="1900" dirty="0" smtClean="0">
+              <a:rPr lang="en-US" sz="2000" dirty="0" smtClean="0">
                 <a:highlight>
                   <a:srgbClr val="FFFFFF"/>
                 </a:highlight>
@@ -8740,7 +8792,7 @@
           <a:p>
             <a:pPr lvl="3"/>
             <a:r>
-              <a:rPr lang="en-US" sz="1900" dirty="0" smtClean="0">
+              <a:rPr lang="en-US" sz="2000" dirty="0" smtClean="0">
                 <a:highlight>
                   <a:srgbClr val="FFFFFF"/>
                 </a:highlight>
@@ -8750,7 +8802,7 @@
               <a:t>2. </a:t>
             </a:r>
             <a:r>
-              <a:rPr lang="ru-RU" sz="1900" dirty="0" smtClean="0">
+              <a:rPr lang="ru-RU" sz="2000" dirty="0" smtClean="0">
                 <a:highlight>
                   <a:srgbClr val="FFFFFF"/>
                 </a:highlight>
@@ -8760,7 +8812,7 @@
               <a:t>Линия (</a:t>
             </a:r>
             <a:r>
-              <a:rPr lang="en-US" sz="1900" dirty="0" smtClean="0">
+              <a:rPr lang="en-US" sz="2000" dirty="0" smtClean="0">
                 <a:highlight>
                   <a:srgbClr val="FFFFFF"/>
                 </a:highlight>
@@ -8769,7 +8821,7 @@
               </a:rPr>
               <a:t>way)</a:t>
             </a:r>
-            <a:endParaRPr lang="en-US" sz="1900" dirty="0" smtClean="0">
+            <a:endParaRPr lang="en-US" sz="2000" dirty="0" smtClean="0">
               <a:solidFill>
                 <a:srgbClr val="0000FF"/>
               </a:solidFill>

</xml_diff>